<commit_message>
Lots of new material and graphics throughout
</commit_message>
<xml_diff>
--- a/images-ggplot2/layers-ggplot2-explosion.pptx
+++ b/images-ggplot2/layers-ggplot2-explosion.pptx
@@ -105,6 +105,11 @@
       </a:defRPr>
     </a:lvl9pPr>
   </p:defaultTextStyle>
+  <p:extLst>
+    <p:ext uri="{EFAFB233-063F-42B5-8137-9DF3F51BA10A}">
+      <p15:sldGuideLst xmlns:p15="http://schemas.microsoft.com/office/powerpoint/2012/main"/>
+    </p:ext>
+  </p:extLst>
 </p:presentation>
 </file>
 
@@ -255,7 +260,7 @@
           <a:p>
             <a:fld id="{9175E57A-E13A-2F4A-928B-85945533E228}" type="datetimeFigureOut">
               <a:rPr lang="en-US" smtClean="0"/>
-              <a:t>2/9/21</a:t>
+              <a:t>2/12/21</a:t>
             </a:fld>
             <a:endParaRPr lang="en-US"/>
           </a:p>
@@ -453,7 +458,7 @@
           <a:p>
             <a:fld id="{9175E57A-E13A-2F4A-928B-85945533E228}" type="datetimeFigureOut">
               <a:rPr lang="en-US" smtClean="0"/>
-              <a:t>2/9/21</a:t>
+              <a:t>2/12/21</a:t>
             </a:fld>
             <a:endParaRPr lang="en-US"/>
           </a:p>
@@ -661,7 +666,7 @@
           <a:p>
             <a:fld id="{9175E57A-E13A-2F4A-928B-85945533E228}" type="datetimeFigureOut">
               <a:rPr lang="en-US" smtClean="0"/>
-              <a:t>2/9/21</a:t>
+              <a:t>2/12/21</a:t>
             </a:fld>
             <a:endParaRPr lang="en-US"/>
           </a:p>
@@ -859,7 +864,7 @@
           <a:p>
             <a:fld id="{9175E57A-E13A-2F4A-928B-85945533E228}" type="datetimeFigureOut">
               <a:rPr lang="en-US" smtClean="0"/>
-              <a:t>2/9/21</a:t>
+              <a:t>2/12/21</a:t>
             </a:fld>
             <a:endParaRPr lang="en-US"/>
           </a:p>
@@ -1134,7 +1139,7 @@
           <a:p>
             <a:fld id="{9175E57A-E13A-2F4A-928B-85945533E228}" type="datetimeFigureOut">
               <a:rPr lang="en-US" smtClean="0"/>
-              <a:t>2/9/21</a:t>
+              <a:t>2/12/21</a:t>
             </a:fld>
             <a:endParaRPr lang="en-US"/>
           </a:p>
@@ -1399,7 +1404,7 @@
           <a:p>
             <a:fld id="{9175E57A-E13A-2F4A-928B-85945533E228}" type="datetimeFigureOut">
               <a:rPr lang="en-US" smtClean="0"/>
-              <a:t>2/9/21</a:t>
+              <a:t>2/12/21</a:t>
             </a:fld>
             <a:endParaRPr lang="en-US"/>
           </a:p>
@@ -1811,7 +1816,7 @@
           <a:p>
             <a:fld id="{9175E57A-E13A-2F4A-928B-85945533E228}" type="datetimeFigureOut">
               <a:rPr lang="en-US" smtClean="0"/>
-              <a:t>2/9/21</a:t>
+              <a:t>2/12/21</a:t>
             </a:fld>
             <a:endParaRPr lang="en-US"/>
           </a:p>
@@ -1952,7 +1957,7 @@
           <a:p>
             <a:fld id="{9175E57A-E13A-2F4A-928B-85945533E228}" type="datetimeFigureOut">
               <a:rPr lang="en-US" smtClean="0"/>
-              <a:t>2/9/21</a:t>
+              <a:t>2/12/21</a:t>
             </a:fld>
             <a:endParaRPr lang="en-US"/>
           </a:p>
@@ -2065,7 +2070,7 @@
           <a:p>
             <a:fld id="{9175E57A-E13A-2F4A-928B-85945533E228}" type="datetimeFigureOut">
               <a:rPr lang="en-US" smtClean="0"/>
-              <a:t>2/9/21</a:t>
+              <a:t>2/12/21</a:t>
             </a:fld>
             <a:endParaRPr lang="en-US"/>
           </a:p>
@@ -2376,7 +2381,7 @@
           <a:p>
             <a:fld id="{9175E57A-E13A-2F4A-928B-85945533E228}" type="datetimeFigureOut">
               <a:rPr lang="en-US" smtClean="0"/>
-              <a:t>2/9/21</a:t>
+              <a:t>2/12/21</a:t>
             </a:fld>
             <a:endParaRPr lang="en-US"/>
           </a:p>
@@ -2664,7 +2669,7 @@
           <a:p>
             <a:fld id="{9175E57A-E13A-2F4A-928B-85945533E228}" type="datetimeFigureOut">
               <a:rPr lang="en-US" smtClean="0"/>
-              <a:t>2/9/21</a:t>
+              <a:t>2/12/21</a:t>
             </a:fld>
             <a:endParaRPr lang="en-US"/>
           </a:p>
@@ -2905,7 +2910,7 @@
           <a:p>
             <a:fld id="{9175E57A-E13A-2F4A-928B-85945533E228}" type="datetimeFigureOut">
               <a:rPr lang="en-US" smtClean="0"/>
-              <a:t>2/9/21</a:t>
+              <a:t>2/12/21</a:t>
             </a:fld>
             <a:endParaRPr lang="en-US"/>
           </a:p>
@@ -3764,120 +3769,6 @@
           </a:p>
         </p:txBody>
       </p:sp>
-      <p:sp>
-        <p:nvSpPr>
-          <p:cNvPr id="5" name="Freeform 4">
-            <a:extLst>
-              <a:ext uri="{FF2B5EF4-FFF2-40B4-BE49-F238E27FC236}">
-                <a16:creationId xmlns:a16="http://schemas.microsoft.com/office/drawing/2014/main" id="{1CD7D67B-7D2D-1A4C-BE9A-DB83C07701AD}"/>
-              </a:ext>
-            </a:extLst>
-          </p:cNvPr>
-          <p:cNvSpPr/>
-          <p:nvPr/>
-        </p:nvSpPr>
-        <p:spPr>
-          <a:xfrm>
-            <a:off x="2484783" y="1789043"/>
-            <a:ext cx="5973417" cy="3180522"/>
-          </a:xfrm>
-          <a:custGeom>
-            <a:avLst/>
-            <a:gdLst>
-              <a:gd name="connsiteX0" fmla="*/ 0 w 5973417"/>
-              <a:gd name="connsiteY0" fmla="*/ 3180522 h 3180522"/>
-              <a:gd name="connsiteX1" fmla="*/ 854765 w 5973417"/>
-              <a:gd name="connsiteY1" fmla="*/ 2136914 h 3180522"/>
-              <a:gd name="connsiteX2" fmla="*/ 2176669 w 5973417"/>
-              <a:gd name="connsiteY2" fmla="*/ 2534479 h 3180522"/>
-              <a:gd name="connsiteX3" fmla="*/ 3409121 w 5973417"/>
-              <a:gd name="connsiteY3" fmla="*/ 954157 h 3180522"/>
-              <a:gd name="connsiteX4" fmla="*/ 5973417 w 5973417"/>
-              <a:gd name="connsiteY4" fmla="*/ 0 h 3180522"/>
-              <a:gd name="connsiteX5" fmla="*/ 5973417 w 5973417"/>
-              <a:gd name="connsiteY5" fmla="*/ 0 h 3180522"/>
-            </a:gdLst>
-            <a:ahLst/>
-            <a:cxnLst>
-              <a:cxn ang="0">
-                <a:pos x="connsiteX0" y="connsiteY0"/>
-              </a:cxn>
-              <a:cxn ang="0">
-                <a:pos x="connsiteX1" y="connsiteY1"/>
-              </a:cxn>
-              <a:cxn ang="0">
-                <a:pos x="connsiteX2" y="connsiteY2"/>
-              </a:cxn>
-              <a:cxn ang="0">
-                <a:pos x="connsiteX3" y="connsiteY3"/>
-              </a:cxn>
-              <a:cxn ang="0">
-                <a:pos x="connsiteX4" y="connsiteY4"/>
-              </a:cxn>
-              <a:cxn ang="0">
-                <a:pos x="connsiteX5" y="connsiteY5"/>
-              </a:cxn>
-            </a:cxnLst>
-            <a:rect l="l" t="t" r="r" b="b"/>
-            <a:pathLst>
-              <a:path w="5973417" h="3180522">
-                <a:moveTo>
-                  <a:pt x="0" y="3180522"/>
-                </a:moveTo>
-                <a:cubicBezTo>
-                  <a:pt x="245993" y="2712555"/>
-                  <a:pt x="491987" y="2244588"/>
-                  <a:pt x="854765" y="2136914"/>
-                </a:cubicBezTo>
-                <a:cubicBezTo>
-                  <a:pt x="1217543" y="2029240"/>
-                  <a:pt x="1750943" y="2731605"/>
-                  <a:pt x="2176669" y="2534479"/>
-                </a:cubicBezTo>
-                <a:cubicBezTo>
-                  <a:pt x="2602395" y="2337353"/>
-                  <a:pt x="2776330" y="1376570"/>
-                  <a:pt x="3409121" y="954157"/>
-                </a:cubicBezTo>
-                <a:cubicBezTo>
-                  <a:pt x="4041912" y="531744"/>
-                  <a:pt x="5973417" y="0"/>
-                  <a:pt x="5973417" y="0"/>
-                </a:cubicBezTo>
-                <a:lnTo>
-                  <a:pt x="5973417" y="0"/>
-                </a:lnTo>
-              </a:path>
-            </a:pathLst>
-          </a:custGeom>
-          <a:noFill/>
-          <a:ln w="63500"/>
-        </p:spPr>
-        <p:style>
-          <a:lnRef idx="2">
-            <a:schemeClr val="accent1">
-              <a:shade val="50000"/>
-            </a:schemeClr>
-          </a:lnRef>
-          <a:fillRef idx="1">
-            <a:schemeClr val="accent1"/>
-          </a:fillRef>
-          <a:effectRef idx="0">
-            <a:schemeClr val="accent1"/>
-          </a:effectRef>
-          <a:fontRef idx="minor">
-            <a:schemeClr val="lt1"/>
-          </a:fontRef>
-        </p:style>
-        <p:txBody>
-          <a:bodyPr rtlCol="0" anchor="ctr"/>
-          <a:lstStyle/>
-          <a:p>
-            <a:pPr algn="ctr"/>
-            <a:endParaRPr lang="en-US" dirty="0"/>
-          </a:p>
-        </p:txBody>
-      </p:sp>
       <p:grpSp>
         <p:nvGrpSpPr>
           <p:cNvPr id="14" name="Group 13">
@@ -4131,6 +4022,253 @@
             <a:p>
               <a:pPr algn="ctr"/>
               <a:endParaRPr lang="en-US" dirty="0"/>
+            </a:p>
+          </p:txBody>
+        </p:sp>
+      </p:grpSp>
+      <p:grpSp>
+        <p:nvGrpSpPr>
+          <p:cNvPr id="3" name="Group 2">
+            <a:extLst>
+              <a:ext uri="{FF2B5EF4-FFF2-40B4-BE49-F238E27FC236}">
+                <a16:creationId xmlns:a16="http://schemas.microsoft.com/office/drawing/2014/main" id="{C4226564-A9DB-0A4E-ADAB-E6A92B4C0E88}"/>
+              </a:ext>
+            </a:extLst>
+          </p:cNvPr>
+          <p:cNvGrpSpPr/>
+          <p:nvPr/>
+        </p:nvGrpSpPr>
+        <p:grpSpPr>
+          <a:xfrm>
+            <a:off x="2833509" y="1933524"/>
+            <a:ext cx="5973417" cy="3180522"/>
+            <a:chOff x="4649767" y="4080531"/>
+            <a:chExt cx="5973417" cy="3180522"/>
+          </a:xfrm>
+        </p:grpSpPr>
+        <p:sp>
+          <p:nvSpPr>
+            <p:cNvPr id="5" name="Freeform 4">
+              <a:extLst>
+                <a:ext uri="{FF2B5EF4-FFF2-40B4-BE49-F238E27FC236}">
+                  <a16:creationId xmlns:a16="http://schemas.microsoft.com/office/drawing/2014/main" id="{1CD7D67B-7D2D-1A4C-BE9A-DB83C07701AD}"/>
+                </a:ext>
+              </a:extLst>
+            </p:cNvPr>
+            <p:cNvSpPr/>
+            <p:nvPr/>
+          </p:nvSpPr>
+          <p:spPr>
+            <a:xfrm>
+              <a:off x="4649767" y="4080531"/>
+              <a:ext cx="5973417" cy="3180522"/>
+            </a:xfrm>
+            <a:custGeom>
+              <a:avLst/>
+              <a:gdLst>
+                <a:gd name="connsiteX0" fmla="*/ 0 w 5973417"/>
+                <a:gd name="connsiteY0" fmla="*/ 3180522 h 3180522"/>
+                <a:gd name="connsiteX1" fmla="*/ 854765 w 5973417"/>
+                <a:gd name="connsiteY1" fmla="*/ 2136914 h 3180522"/>
+                <a:gd name="connsiteX2" fmla="*/ 2176669 w 5973417"/>
+                <a:gd name="connsiteY2" fmla="*/ 2534479 h 3180522"/>
+                <a:gd name="connsiteX3" fmla="*/ 3409121 w 5973417"/>
+                <a:gd name="connsiteY3" fmla="*/ 954157 h 3180522"/>
+                <a:gd name="connsiteX4" fmla="*/ 5973417 w 5973417"/>
+                <a:gd name="connsiteY4" fmla="*/ 0 h 3180522"/>
+                <a:gd name="connsiteX5" fmla="*/ 5973417 w 5973417"/>
+                <a:gd name="connsiteY5" fmla="*/ 0 h 3180522"/>
+              </a:gdLst>
+              <a:ahLst/>
+              <a:cxnLst>
+                <a:cxn ang="0">
+                  <a:pos x="connsiteX0" y="connsiteY0"/>
+                </a:cxn>
+                <a:cxn ang="0">
+                  <a:pos x="connsiteX1" y="connsiteY1"/>
+                </a:cxn>
+                <a:cxn ang="0">
+                  <a:pos x="connsiteX2" y="connsiteY2"/>
+                </a:cxn>
+                <a:cxn ang="0">
+                  <a:pos x="connsiteX3" y="connsiteY3"/>
+                </a:cxn>
+                <a:cxn ang="0">
+                  <a:pos x="connsiteX4" y="connsiteY4"/>
+                </a:cxn>
+                <a:cxn ang="0">
+                  <a:pos x="connsiteX5" y="connsiteY5"/>
+                </a:cxn>
+              </a:cxnLst>
+              <a:rect l="l" t="t" r="r" b="b"/>
+              <a:pathLst>
+                <a:path w="5973417" h="3180522">
+                  <a:moveTo>
+                    <a:pt x="0" y="3180522"/>
+                  </a:moveTo>
+                  <a:cubicBezTo>
+                    <a:pt x="245993" y="2712555"/>
+                    <a:pt x="491987" y="2244588"/>
+                    <a:pt x="854765" y="2136914"/>
+                  </a:cubicBezTo>
+                  <a:cubicBezTo>
+                    <a:pt x="1217543" y="2029240"/>
+                    <a:pt x="1750943" y="2731605"/>
+                    <a:pt x="2176669" y="2534479"/>
+                  </a:cubicBezTo>
+                  <a:cubicBezTo>
+                    <a:pt x="2602395" y="2337353"/>
+                    <a:pt x="2776330" y="1376570"/>
+                    <a:pt x="3409121" y="954157"/>
+                  </a:cubicBezTo>
+                  <a:cubicBezTo>
+                    <a:pt x="4041912" y="531744"/>
+                    <a:pt x="5973417" y="0"/>
+                    <a:pt x="5973417" y="0"/>
+                  </a:cubicBezTo>
+                  <a:lnTo>
+                    <a:pt x="5973417" y="0"/>
+                  </a:lnTo>
+                </a:path>
+              </a:pathLst>
+            </a:custGeom>
+            <a:noFill/>
+            <a:ln w="63500">
+              <a:solidFill>
+                <a:schemeClr val="tx1"/>
+              </a:solidFill>
+            </a:ln>
+          </p:spPr>
+          <p:style>
+            <a:lnRef idx="2">
+              <a:schemeClr val="accent1">
+                <a:shade val="50000"/>
+              </a:schemeClr>
+            </a:lnRef>
+            <a:fillRef idx="1">
+              <a:schemeClr val="accent1"/>
+            </a:fillRef>
+            <a:effectRef idx="0">
+              <a:schemeClr val="accent1"/>
+            </a:effectRef>
+            <a:fontRef idx="minor">
+              <a:schemeClr val="lt1"/>
+            </a:fontRef>
+          </p:style>
+          <p:txBody>
+            <a:bodyPr rtlCol="0" anchor="ctr"/>
+            <a:lstStyle/>
+            <a:p>
+              <a:pPr algn="ctr"/>
+              <a:endParaRPr lang="en-US" dirty="0"/>
+            </a:p>
+          </p:txBody>
+        </p:sp>
+        <p:sp>
+          <p:nvSpPr>
+            <p:cNvPr id="2" name="Oval 1">
+              <a:extLst>
+                <a:ext uri="{FF2B5EF4-FFF2-40B4-BE49-F238E27FC236}">
+                  <a16:creationId xmlns:a16="http://schemas.microsoft.com/office/drawing/2014/main" id="{1FE5BD90-C00B-A945-A38D-5B02DCF1536C}"/>
+                </a:ext>
+              </a:extLst>
+            </p:cNvPr>
+            <p:cNvSpPr/>
+            <p:nvPr/>
+          </p:nvSpPr>
+          <p:spPr>
+            <a:xfrm>
+              <a:off x="8132375" y="5279155"/>
+              <a:ext cx="405996" cy="365609"/>
+            </a:xfrm>
+            <a:prstGeom prst="ellipse">
+              <a:avLst/>
+            </a:prstGeom>
+            <a:solidFill>
+              <a:schemeClr val="tx1"/>
+            </a:solidFill>
+            <a:ln>
+              <a:solidFill>
+                <a:schemeClr val="tx1"/>
+              </a:solidFill>
+            </a:ln>
+          </p:spPr>
+          <p:style>
+            <a:lnRef idx="2">
+              <a:schemeClr val="accent1">
+                <a:shade val="50000"/>
+              </a:schemeClr>
+            </a:lnRef>
+            <a:fillRef idx="1">
+              <a:schemeClr val="accent1"/>
+            </a:fillRef>
+            <a:effectRef idx="0">
+              <a:schemeClr val="accent1"/>
+            </a:effectRef>
+            <a:fontRef idx="minor">
+              <a:schemeClr val="lt1"/>
+            </a:fontRef>
+          </p:style>
+          <p:txBody>
+            <a:bodyPr rtlCol="0" anchor="ctr"/>
+            <a:lstStyle/>
+            <a:p>
+              <a:pPr algn="ctr"/>
+              <a:endParaRPr lang="en-US"/>
+            </a:p>
+          </p:txBody>
+        </p:sp>
+        <p:sp>
+          <p:nvSpPr>
+            <p:cNvPr id="20" name="Oval 19">
+              <a:extLst>
+                <a:ext uri="{FF2B5EF4-FFF2-40B4-BE49-F238E27FC236}">
+                  <a16:creationId xmlns:a16="http://schemas.microsoft.com/office/drawing/2014/main" id="{9E9B11C4-E41E-6748-BFD7-3EFB3B774D2A}"/>
+                </a:ext>
+              </a:extLst>
+            </p:cNvPr>
+            <p:cNvSpPr/>
+            <p:nvPr/>
+          </p:nvSpPr>
+          <p:spPr>
+            <a:xfrm>
+              <a:off x="6382403" y="5894010"/>
+              <a:ext cx="405996" cy="365609"/>
+            </a:xfrm>
+            <a:prstGeom prst="ellipse">
+              <a:avLst/>
+            </a:prstGeom>
+            <a:solidFill>
+              <a:schemeClr val="tx1"/>
+            </a:solidFill>
+            <a:ln>
+              <a:solidFill>
+                <a:schemeClr val="tx1"/>
+              </a:solidFill>
+            </a:ln>
+          </p:spPr>
+          <p:style>
+            <a:lnRef idx="2">
+              <a:schemeClr val="accent1">
+                <a:shade val="50000"/>
+              </a:schemeClr>
+            </a:lnRef>
+            <a:fillRef idx="1">
+              <a:schemeClr val="accent1"/>
+            </a:fillRef>
+            <a:effectRef idx="0">
+              <a:schemeClr val="accent1"/>
+            </a:effectRef>
+            <a:fontRef idx="minor">
+              <a:schemeClr val="lt1"/>
+            </a:fontRef>
+          </p:style>
+          <p:txBody>
+            <a:bodyPr rtlCol="0" anchor="ctr"/>
+            <a:lstStyle/>
+            <a:p>
+              <a:pPr algn="ctr"/>
+              <a:endParaRPr lang="en-US"/>
             </a:p>
           </p:txBody>
         </p:sp>

</xml_diff>